<commit_message>
Update prior visit to Nico
</commit_message>
<xml_diff>
--- a/s_id/docs/System Identification to support Flight Test activities - proposal.pptx
+++ b/s_id/docs/System Identification to support Flight Test activities - proposal.pptx
@@ -5,23 +5,26 @@
     <p:sldMasterId id="2147483660" r:id="rId1"/>
   </p:sldMasterIdLst>
   <p:notesMasterIdLst>
-    <p:notesMasterId r:id="rId13"/>
+    <p:notesMasterId r:id="rId16"/>
   </p:notesMasterIdLst>
   <p:handoutMasterIdLst>
-    <p:handoutMasterId r:id="rId14"/>
+    <p:handoutMasterId r:id="rId17"/>
   </p:handoutMasterIdLst>
   <p:sldIdLst>
     <p:sldId id="267" r:id="rId2"/>
-    <p:sldId id="258" r:id="rId3"/>
-    <p:sldId id="268" r:id="rId4"/>
-    <p:sldId id="269" r:id="rId5"/>
-    <p:sldId id="270" r:id="rId6"/>
-    <p:sldId id="271" r:id="rId7"/>
-    <p:sldId id="273" r:id="rId8"/>
-    <p:sldId id="274" r:id="rId9"/>
-    <p:sldId id="272" r:id="rId10"/>
-    <p:sldId id="262" r:id="rId11"/>
-    <p:sldId id="263" r:id="rId12"/>
+    <p:sldId id="277" r:id="rId3"/>
+    <p:sldId id="258" r:id="rId4"/>
+    <p:sldId id="268" r:id="rId5"/>
+    <p:sldId id="269" r:id="rId6"/>
+    <p:sldId id="270" r:id="rId7"/>
+    <p:sldId id="271" r:id="rId8"/>
+    <p:sldId id="273" r:id="rId9"/>
+    <p:sldId id="274" r:id="rId10"/>
+    <p:sldId id="275" r:id="rId11"/>
+    <p:sldId id="272" r:id="rId12"/>
+    <p:sldId id="276" r:id="rId13"/>
+    <p:sldId id="262" r:id="rId14"/>
+    <p:sldId id="263" r:id="rId15"/>
   </p:sldIdLst>
   <p:sldSz cx="9144000" cy="6858000" type="screen4x3"/>
   <p:notesSz cx="6858000" cy="9144000"/>
@@ -319,7 +322,7 @@
             <a:fld id="{5F3C0F99-304F-6E49-843F-5351A15493DC}" type="slidenum">
               <a:rPr lang="en-GB" smtClean="0"/>
               <a:pPr/>
-              <a:t>‹Nr.›</a:t>
+              <a:t>‹#›</a:t>
             </a:fld>
             <a:endParaRPr lang="en-GB"/>
           </a:p>
@@ -579,7 +582,7 @@
             <a:fld id="{0D8DCBD1-C1B4-0949-A20B-F84C20C9707E}" type="slidenum">
               <a:rPr lang="en-GB" smtClean="0"/>
               <a:pPr/>
-              <a:t>‹Nr.›</a:t>
+              <a:t>‹#›</a:t>
             </a:fld>
             <a:endParaRPr lang="en-GB"/>
           </a:p>
@@ -1105,7 +1108,7 @@
             <a:fld id="{011C9D03-AE4A-2848-9956-B167AE17B095}" type="slidenum">
               <a:rPr lang="en-GB" smtClean="0"/>
               <a:pPr/>
-              <a:t>‹Nr.›</a:t>
+              <a:t>‹#›</a:t>
             </a:fld>
             <a:endParaRPr lang="en-GB" dirty="0"/>
           </a:p>
@@ -1400,7 +1403,7 @@
             <a:fld id="{011C9D03-AE4A-2848-9956-B167AE17B095}" type="slidenum">
               <a:rPr lang="en-GB" smtClean="0"/>
               <a:pPr/>
-              <a:t>‹Nr.›</a:t>
+              <a:t>‹#›</a:t>
             </a:fld>
             <a:endParaRPr lang="en-GB" dirty="0"/>
           </a:p>
@@ -1960,7 +1963,7 @@
             <a:fld id="{011C9D03-AE4A-2848-9956-B167AE17B095}" type="slidenum">
               <a:rPr lang="en-GB" smtClean="0"/>
               <a:pPr/>
-              <a:t>‹Nr.›</a:t>
+              <a:t>‹#›</a:t>
             </a:fld>
             <a:endParaRPr lang="en-GB" dirty="0"/>
           </a:p>
@@ -2236,7 +2239,7 @@
             <a:fld id="{011C9D03-AE4A-2848-9956-B167AE17B095}" type="slidenum">
               <a:rPr lang="en-GB" smtClean="0"/>
               <a:pPr/>
-              <a:t>‹Nr.›</a:t>
+              <a:t>‹#›</a:t>
             </a:fld>
             <a:endParaRPr lang="en-GB"/>
           </a:p>
@@ -3106,7 +3109,7 @@
             <a:fld id="{011C9D03-AE4A-2848-9956-B167AE17B095}" type="slidenum">
               <a:rPr lang="en-GB" smtClean="0"/>
               <a:pPr/>
-              <a:t>‹Nr.›</a:t>
+              <a:t>‹#›</a:t>
             </a:fld>
             <a:endParaRPr lang="en-GB"/>
           </a:p>
@@ -3460,7 +3463,7 @@
             <a:fld id="{011C9D03-AE4A-2848-9956-B167AE17B095}" type="slidenum">
               <a:rPr lang="en-GB" smtClean="0"/>
               <a:pPr/>
-              <a:t>‹Nr.›</a:t>
+              <a:t>‹#›</a:t>
             </a:fld>
             <a:endParaRPr lang="en-GB"/>
           </a:p>
@@ -4364,7 +4367,7 @@
             <a:fld id="{011C9D03-AE4A-2848-9956-B167AE17B095}" type="slidenum">
               <a:rPr lang="en-GB" smtClean="0"/>
               <a:pPr/>
-              <a:t>‹Nr.›</a:t>
+              <a:t>‹#›</a:t>
             </a:fld>
             <a:endParaRPr lang="en-GB"/>
           </a:p>
@@ -4761,6 +4764,719 @@
 <file path=ppt/slides/slide10.xml><?xml version="1.0" encoding="utf-8"?>
 <p:sld xmlns:a="http://schemas.openxmlformats.org/drawingml/2006/main" xmlns:r="http://schemas.openxmlformats.org/officeDocument/2006/relationships" xmlns:p="http://schemas.openxmlformats.org/presentationml/2006/main">
   <p:cSld>
+    <p:spTree>
+      <p:nvGrpSpPr>
+        <p:cNvPr id="1" name=""/>
+        <p:cNvGrpSpPr/>
+        <p:nvPr/>
+      </p:nvGrpSpPr>
+      <p:grpSpPr>
+        <a:xfrm>
+          <a:off x="0" y="0"/>
+          <a:ext cx="0" cy="0"/>
+          <a:chOff x="0" y="0"/>
+          <a:chExt cx="0" cy="0"/>
+        </a:xfrm>
+      </p:grpSpPr>
+      <p:sp>
+        <p:nvSpPr>
+          <p:cNvPr id="2" name="Title 1">
+            <a:extLst>
+              <a:ext uri="{FF2B5EF4-FFF2-40B4-BE49-F238E27FC236}">
+                <a16:creationId xmlns:a16="http://schemas.microsoft.com/office/drawing/2014/main" id="{AE4259FB-36D9-684C-95F0-18535CB57C6B}"/>
+              </a:ext>
+            </a:extLst>
+          </p:cNvPr>
+          <p:cNvSpPr>
+            <a:spLocks noGrp="1"/>
+          </p:cNvSpPr>
+          <p:nvPr>
+            <p:ph type="title"/>
+          </p:nvPr>
+        </p:nvSpPr>
+        <p:spPr>
+          <a:xfrm>
+            <a:off x="504000" y="392724"/>
+            <a:ext cx="6523643" cy="472431"/>
+          </a:xfrm>
+        </p:spPr>
+        <p:txBody>
+          <a:bodyPr anchor="b"/>
+          <a:lstStyle/>
+          <a:p>
+            <a:r>
+              <a:rPr lang="en-GB" dirty="0" smtClean="0"/>
+              <a:t>Tools</a:t>
+            </a:r>
+            <a:endParaRPr lang="en-GB" dirty="0"/>
+          </a:p>
+        </p:txBody>
+      </p:sp>
+      <p:sp>
+        <p:nvSpPr>
+          <p:cNvPr id="7" name="Text Placeholder 6">
+            <a:extLst>
+              <a:ext uri="{FF2B5EF4-FFF2-40B4-BE49-F238E27FC236}">
+                <a16:creationId xmlns:a16="http://schemas.microsoft.com/office/drawing/2014/main" id="{E1ED1E1C-C805-0D4B-BE34-F08F4C566B7B}"/>
+              </a:ext>
+            </a:extLst>
+          </p:cNvPr>
+          <p:cNvSpPr>
+            <a:spLocks noGrp="1"/>
+          </p:cNvSpPr>
+          <p:nvPr>
+            <p:ph type="body" idx="14"/>
+          </p:nvPr>
+        </p:nvSpPr>
+        <p:spPr/>
+        <p:txBody>
+          <a:bodyPr/>
+          <a:lstStyle/>
+          <a:p>
+            <a:r>
+              <a:rPr lang="en-GB" dirty="0"/>
+              <a:t>@ </a:t>
+            </a:r>
+            <a:r>
+              <a:rPr lang="en-GB" dirty="0" err="1"/>
+              <a:t>Kopter</a:t>
+            </a:r>
+            <a:r>
+              <a:rPr lang="en-GB" dirty="0"/>
+              <a:t> Group AG | Alejandro Valverde</a:t>
+            </a:r>
+          </a:p>
+        </p:txBody>
+      </p:sp>
+      <p:sp>
+        <p:nvSpPr>
+          <p:cNvPr id="4" name="Slide Number Placeholder 3"/>
+          <p:cNvSpPr>
+            <a:spLocks noGrp="1"/>
+          </p:cNvSpPr>
+          <p:nvPr>
+            <p:ph type="sldNum" sz="quarter" idx="12"/>
+          </p:nvPr>
+        </p:nvSpPr>
+        <p:spPr/>
+        <p:txBody>
+          <a:bodyPr/>
+          <a:lstStyle/>
+          <a:p>
+            <a:fld id="{011C9D03-AE4A-2848-9956-B167AE17B095}" type="slidenum">
+              <a:rPr lang="en-GB" smtClean="0"/>
+              <a:pPr/>
+              <a:t>10</a:t>
+            </a:fld>
+            <a:endParaRPr lang="en-GB" dirty="0"/>
+          </a:p>
+        </p:txBody>
+      </p:sp>
+      <p:sp>
+        <p:nvSpPr>
+          <p:cNvPr id="5" name="Date Placeholder 4"/>
+          <p:cNvSpPr>
+            <a:spLocks noGrp="1"/>
+          </p:cNvSpPr>
+          <p:nvPr>
+            <p:ph type="dt" sz="half" idx="10"/>
+          </p:nvPr>
+        </p:nvSpPr>
+        <p:spPr/>
+        <p:txBody>
+          <a:bodyPr/>
+          <a:lstStyle/>
+          <a:p>
+            <a:fld id="{16C1D5B0-5220-44BF-BD99-44FE20BE1773}" type="datetime5">
+              <a:rPr lang="en-US" smtClean="0"/>
+              <a:t>22-Feb-18</a:t>
+            </a:fld>
+            <a:endParaRPr lang="en-GB" dirty="0"/>
+          </a:p>
+        </p:txBody>
+      </p:sp>
+      <p:sp>
+        <p:nvSpPr>
+          <p:cNvPr id="8" name="Content Placeholder 2">
+            <a:extLst>
+              <a:ext uri="{FF2B5EF4-FFF2-40B4-BE49-F238E27FC236}">
+                <a16:creationId xmlns:a16="http://schemas.microsoft.com/office/drawing/2014/main" id="{C19AF051-9B1E-C04B-A28B-18DE801F3709}"/>
+              </a:ext>
+            </a:extLst>
+          </p:cNvPr>
+          <p:cNvSpPr>
+            <a:spLocks noGrp="1"/>
+          </p:cNvSpPr>
+          <p:nvPr>
+            <p:ph idx="1"/>
+          </p:nvPr>
+        </p:nvSpPr>
+        <p:spPr>
+          <a:xfrm>
+            <a:off x="868461" y="1634329"/>
+            <a:ext cx="4400550" cy="3882980"/>
+          </a:xfrm>
+        </p:spPr>
+        <p:txBody>
+          <a:bodyPr/>
+          <a:lstStyle/>
+          <a:p>
+            <a:pPr marL="342900" indent="-342900">
+              <a:buFont typeface="Arial" panose="020B0604020202020204" pitchFamily="34" charset="0"/>
+              <a:buChar char="•"/>
+            </a:pPr>
+            <a:r>
+              <a:rPr lang="en-GB" dirty="0" smtClean="0"/>
+              <a:t>Already available</a:t>
+            </a:r>
+          </a:p>
+          <a:p>
+            <a:pPr marL="342900" indent="-342900">
+              <a:buFont typeface="Arial" panose="020B0604020202020204" pitchFamily="34" charset="0"/>
+              <a:buChar char="•"/>
+            </a:pPr>
+            <a:endParaRPr lang="en-GB" dirty="0" smtClean="0"/>
+          </a:p>
+          <a:p>
+            <a:pPr marL="342900" indent="-342900">
+              <a:buFont typeface="Arial" panose="020B0604020202020204" pitchFamily="34" charset="0"/>
+              <a:buChar char="•"/>
+            </a:pPr>
+            <a:r>
+              <a:rPr lang="en-GB" dirty="0" smtClean="0"/>
+              <a:t>No development time needed</a:t>
+            </a:r>
+          </a:p>
+          <a:p>
+            <a:pPr marL="342900" indent="-342900">
+              <a:buFont typeface="Arial" panose="020B0604020202020204" pitchFamily="34" charset="0"/>
+              <a:buChar char="•"/>
+            </a:pPr>
+            <a:endParaRPr lang="en-GB" dirty="0"/>
+          </a:p>
+          <a:p>
+            <a:pPr marL="342900" indent="-342900">
+              <a:buFont typeface="Arial" panose="020B0604020202020204" pitchFamily="34" charset="0"/>
+              <a:buChar char="•"/>
+            </a:pPr>
+            <a:r>
+              <a:rPr lang="en-GB" dirty="0" smtClean="0"/>
+              <a:t>Proven industry suitable software</a:t>
+            </a:r>
+          </a:p>
+          <a:p>
+            <a:pPr marL="342900" indent="-342900">
+              <a:buFont typeface="Arial" panose="020B0604020202020204" pitchFamily="34" charset="0"/>
+              <a:buChar char="•"/>
+            </a:pPr>
+            <a:endParaRPr lang="en-GB" dirty="0"/>
+          </a:p>
+          <a:p>
+            <a:pPr marL="342900" indent="-342900">
+              <a:buFont typeface="Arial" panose="020B0604020202020204" pitchFamily="34" charset="0"/>
+              <a:buChar char="•"/>
+            </a:pPr>
+            <a:r>
+              <a:rPr lang="en-GB" dirty="0" smtClean="0"/>
+              <a:t>Further ways:</a:t>
+            </a:r>
+          </a:p>
+          <a:p>
+            <a:pPr marL="451512" lvl="2" indent="-342900">
+              <a:buFont typeface="Arial" panose="020B0604020202020204" pitchFamily="34" charset="0"/>
+              <a:buChar char="•"/>
+            </a:pPr>
+            <a:endParaRPr lang="en-GB" dirty="0" smtClean="0"/>
+          </a:p>
+          <a:p>
+            <a:pPr marL="451512" lvl="2" indent="-342900">
+              <a:buFont typeface="Arial" panose="020B0604020202020204" pitchFamily="34" charset="0"/>
+              <a:buChar char="•"/>
+            </a:pPr>
+            <a:r>
+              <a:rPr lang="en-GB" dirty="0" smtClean="0"/>
+              <a:t>Python implementation</a:t>
+            </a:r>
+          </a:p>
+          <a:p>
+            <a:pPr marL="0" indent="0">
+              <a:buNone/>
+            </a:pPr>
+            <a:endParaRPr lang="en-GB" dirty="0"/>
+          </a:p>
+        </p:txBody>
+      </p:sp>
+      <p:pic>
+        <p:nvPicPr>
+          <p:cNvPr id="9" name="Picture 8"/>
+          <p:cNvPicPr>
+            <a:picLocks noChangeAspect="1"/>
+          </p:cNvPicPr>
+          <p:nvPr/>
+        </p:nvPicPr>
+        <p:blipFill>
+          <a:blip r:embed="rId2"/>
+          <a:stretch>
+            <a:fillRect/>
+          </a:stretch>
+        </p:blipFill>
+        <p:spPr>
+          <a:xfrm>
+            <a:off x="5521675" y="1804035"/>
+            <a:ext cx="3011936" cy="3964966"/>
+          </a:xfrm>
+          <a:prstGeom prst="rect">
+            <a:avLst/>
+          </a:prstGeom>
+        </p:spPr>
+      </p:pic>
+    </p:spTree>
+    <p:extLst>
+      <p:ext uri="{BB962C8B-B14F-4D97-AF65-F5344CB8AC3E}">
+        <p14:creationId xmlns:p14="http://schemas.microsoft.com/office/powerpoint/2010/main" val="2734948036"/>
+      </p:ext>
+    </p:extLst>
+  </p:cSld>
+  <p:clrMapOvr>
+    <a:masterClrMapping/>
+  </p:clrMapOvr>
+</p:sld>
+</file>
+
+<file path=ppt/slides/slide11.xml><?xml version="1.0" encoding="utf-8"?>
+<p:sld xmlns:a="http://schemas.openxmlformats.org/drawingml/2006/main" xmlns:r="http://schemas.openxmlformats.org/officeDocument/2006/relationships" xmlns:p="http://schemas.openxmlformats.org/presentationml/2006/main">
+  <p:cSld>
+    <p:spTree>
+      <p:nvGrpSpPr>
+        <p:cNvPr id="1" name=""/>
+        <p:cNvGrpSpPr/>
+        <p:nvPr/>
+      </p:nvGrpSpPr>
+      <p:grpSpPr>
+        <a:xfrm>
+          <a:off x="0" y="0"/>
+          <a:ext cx="0" cy="0"/>
+          <a:chOff x="0" y="0"/>
+          <a:chExt cx="0" cy="0"/>
+        </a:xfrm>
+      </p:grpSpPr>
+      <p:sp>
+        <p:nvSpPr>
+          <p:cNvPr id="2" name="Title 1">
+            <a:extLst>
+              <a:ext uri="{FF2B5EF4-FFF2-40B4-BE49-F238E27FC236}">
+                <a16:creationId xmlns:a16="http://schemas.microsoft.com/office/drawing/2014/main" id="{AE4259FB-36D9-684C-95F0-18535CB57C6B}"/>
+              </a:ext>
+            </a:extLst>
+          </p:cNvPr>
+          <p:cNvSpPr>
+            <a:spLocks noGrp="1"/>
+          </p:cNvSpPr>
+          <p:nvPr>
+            <p:ph type="title"/>
+          </p:nvPr>
+        </p:nvSpPr>
+        <p:spPr>
+          <a:xfrm>
+            <a:off x="504000" y="392724"/>
+            <a:ext cx="6523643" cy="472431"/>
+          </a:xfrm>
+        </p:spPr>
+        <p:txBody>
+          <a:bodyPr anchor="b"/>
+          <a:lstStyle/>
+          <a:p>
+            <a:r>
+              <a:rPr lang="en-GB" dirty="0"/>
+              <a:t>What would I need?</a:t>
+            </a:r>
+          </a:p>
+        </p:txBody>
+      </p:sp>
+      <p:sp>
+        <p:nvSpPr>
+          <p:cNvPr id="3" name="Content Placeholder 2">
+            <a:extLst>
+              <a:ext uri="{FF2B5EF4-FFF2-40B4-BE49-F238E27FC236}">
+                <a16:creationId xmlns:a16="http://schemas.microsoft.com/office/drawing/2014/main" id="{C19AF051-9B1E-C04B-A28B-18DE801F3709}"/>
+              </a:ext>
+            </a:extLst>
+          </p:cNvPr>
+          <p:cNvSpPr>
+            <a:spLocks noGrp="1"/>
+          </p:cNvSpPr>
+          <p:nvPr>
+            <p:ph idx="1"/>
+          </p:nvPr>
+        </p:nvSpPr>
+        <p:spPr>
+          <a:xfrm>
+            <a:off x="504000" y="1148993"/>
+            <a:ext cx="7810500" cy="4576557"/>
+          </a:xfrm>
+        </p:spPr>
+        <p:txBody>
+          <a:bodyPr/>
+          <a:lstStyle/>
+          <a:p>
+            <a:pPr marL="0" indent="0">
+              <a:buNone/>
+            </a:pPr>
+            <a:r>
+              <a:rPr lang="en-GB" dirty="0"/>
+              <a:t>A laptop </a:t>
+            </a:r>
+          </a:p>
+          <a:p>
+            <a:pPr marL="0" indent="0">
+              <a:buNone/>
+            </a:pPr>
+            <a:endParaRPr lang="en-GB" dirty="0"/>
+          </a:p>
+          <a:p>
+            <a:pPr marL="0" indent="0">
+              <a:buNone/>
+            </a:pPr>
+            <a:r>
+              <a:rPr lang="en-GB" dirty="0"/>
+              <a:t>some accelerometers installed in P3, a part from the usual instrumentation…</a:t>
+            </a:r>
+          </a:p>
+          <a:p>
+            <a:pPr marL="0" indent="0">
+              <a:buNone/>
+            </a:pPr>
+            <a:endParaRPr lang="en-GB" dirty="0"/>
+          </a:p>
+          <a:p>
+            <a:pPr marL="0" indent="0">
+              <a:buNone/>
+            </a:pPr>
+            <a:r>
+              <a:rPr lang="en-GB" dirty="0"/>
+              <a:t>Some coffee</a:t>
+            </a:r>
+          </a:p>
+          <a:p>
+            <a:pPr marL="0" indent="0">
+              <a:buNone/>
+            </a:pPr>
+            <a:endParaRPr lang="en-GB" dirty="0"/>
+          </a:p>
+          <a:p>
+            <a:pPr marL="0" indent="0">
+              <a:buNone/>
+            </a:pPr>
+            <a:endParaRPr lang="en-GB" dirty="0"/>
+          </a:p>
+        </p:txBody>
+      </p:sp>
+      <p:sp>
+        <p:nvSpPr>
+          <p:cNvPr id="7" name="Text Placeholder 6">
+            <a:extLst>
+              <a:ext uri="{FF2B5EF4-FFF2-40B4-BE49-F238E27FC236}">
+                <a16:creationId xmlns:a16="http://schemas.microsoft.com/office/drawing/2014/main" id="{E1ED1E1C-C805-0D4B-BE34-F08F4C566B7B}"/>
+              </a:ext>
+            </a:extLst>
+          </p:cNvPr>
+          <p:cNvSpPr>
+            <a:spLocks noGrp="1"/>
+          </p:cNvSpPr>
+          <p:nvPr>
+            <p:ph type="body" idx="14"/>
+          </p:nvPr>
+        </p:nvSpPr>
+        <p:spPr/>
+        <p:txBody>
+          <a:bodyPr/>
+          <a:lstStyle/>
+          <a:p>
+            <a:r>
+              <a:rPr lang="en-GB" dirty="0"/>
+              <a:t>@ </a:t>
+            </a:r>
+            <a:r>
+              <a:rPr lang="en-GB" dirty="0" err="1"/>
+              <a:t>Kopter</a:t>
+            </a:r>
+            <a:r>
+              <a:rPr lang="en-GB" dirty="0"/>
+              <a:t> Group AG | Alejandro Valverde</a:t>
+            </a:r>
+          </a:p>
+        </p:txBody>
+      </p:sp>
+      <p:sp>
+        <p:nvSpPr>
+          <p:cNvPr id="4" name="Slide Number Placeholder 3"/>
+          <p:cNvSpPr>
+            <a:spLocks noGrp="1"/>
+          </p:cNvSpPr>
+          <p:nvPr>
+            <p:ph type="sldNum" sz="quarter" idx="12"/>
+          </p:nvPr>
+        </p:nvSpPr>
+        <p:spPr/>
+        <p:txBody>
+          <a:bodyPr/>
+          <a:lstStyle/>
+          <a:p>
+            <a:fld id="{011C9D03-AE4A-2848-9956-B167AE17B095}" type="slidenum">
+              <a:rPr lang="en-GB" smtClean="0"/>
+              <a:pPr/>
+              <a:t>11</a:t>
+            </a:fld>
+            <a:endParaRPr lang="en-GB" dirty="0"/>
+          </a:p>
+        </p:txBody>
+      </p:sp>
+      <p:sp>
+        <p:nvSpPr>
+          <p:cNvPr id="5" name="Date Placeholder 4"/>
+          <p:cNvSpPr>
+            <a:spLocks noGrp="1"/>
+          </p:cNvSpPr>
+          <p:nvPr>
+            <p:ph type="dt" sz="half" idx="10"/>
+          </p:nvPr>
+        </p:nvSpPr>
+        <p:spPr/>
+        <p:txBody>
+          <a:bodyPr/>
+          <a:lstStyle/>
+          <a:p>
+            <a:fld id="{16C1D5B0-5220-44BF-BD99-44FE20BE1773}" type="datetime5">
+              <a:rPr lang="en-US" smtClean="0"/>
+              <a:t>22-Feb-18</a:t>
+            </a:fld>
+            <a:endParaRPr lang="en-GB" dirty="0"/>
+          </a:p>
+        </p:txBody>
+      </p:sp>
+    </p:spTree>
+    <p:extLst>
+      <p:ext uri="{BB962C8B-B14F-4D97-AF65-F5344CB8AC3E}">
+        <p14:creationId xmlns:p14="http://schemas.microsoft.com/office/powerpoint/2010/main" val="3427268158"/>
+      </p:ext>
+    </p:extLst>
+  </p:cSld>
+  <p:clrMapOvr>
+    <a:masterClrMapping/>
+  </p:clrMapOvr>
+</p:sld>
+</file>
+
+<file path=ppt/slides/slide12.xml><?xml version="1.0" encoding="utf-8"?>
+<p:sld xmlns:a="http://schemas.openxmlformats.org/drawingml/2006/main" xmlns:r="http://schemas.openxmlformats.org/officeDocument/2006/relationships" xmlns:p="http://schemas.openxmlformats.org/presentationml/2006/main">
+  <p:cSld>
+    <p:spTree>
+      <p:nvGrpSpPr>
+        <p:cNvPr id="1" name=""/>
+        <p:cNvGrpSpPr/>
+        <p:nvPr/>
+      </p:nvGrpSpPr>
+      <p:grpSpPr>
+        <a:xfrm>
+          <a:off x="0" y="0"/>
+          <a:ext cx="0" cy="0"/>
+          <a:chOff x="0" y="0"/>
+          <a:chExt cx="0" cy="0"/>
+        </a:xfrm>
+      </p:grpSpPr>
+      <p:sp>
+        <p:nvSpPr>
+          <p:cNvPr id="2" name="Title 1">
+            <a:extLst>
+              <a:ext uri="{FF2B5EF4-FFF2-40B4-BE49-F238E27FC236}">
+                <a16:creationId xmlns:a16="http://schemas.microsoft.com/office/drawing/2014/main" id="{AE4259FB-36D9-684C-95F0-18535CB57C6B}"/>
+              </a:ext>
+            </a:extLst>
+          </p:cNvPr>
+          <p:cNvSpPr>
+            <a:spLocks noGrp="1"/>
+          </p:cNvSpPr>
+          <p:nvPr>
+            <p:ph type="title"/>
+          </p:nvPr>
+        </p:nvSpPr>
+        <p:spPr>
+          <a:xfrm>
+            <a:off x="504000" y="392724"/>
+            <a:ext cx="6523643" cy="472431"/>
+          </a:xfrm>
+        </p:spPr>
+        <p:txBody>
+          <a:bodyPr anchor="b"/>
+          <a:lstStyle/>
+          <a:p>
+            <a:r>
+              <a:rPr lang="en-GB" dirty="0" smtClean="0"/>
+              <a:t>Tools</a:t>
+            </a:r>
+            <a:endParaRPr lang="en-GB" dirty="0"/>
+          </a:p>
+        </p:txBody>
+      </p:sp>
+      <p:sp>
+        <p:nvSpPr>
+          <p:cNvPr id="7" name="Text Placeholder 6">
+            <a:extLst>
+              <a:ext uri="{FF2B5EF4-FFF2-40B4-BE49-F238E27FC236}">
+                <a16:creationId xmlns:a16="http://schemas.microsoft.com/office/drawing/2014/main" id="{E1ED1E1C-C805-0D4B-BE34-F08F4C566B7B}"/>
+              </a:ext>
+            </a:extLst>
+          </p:cNvPr>
+          <p:cNvSpPr>
+            <a:spLocks noGrp="1"/>
+          </p:cNvSpPr>
+          <p:nvPr>
+            <p:ph type="body" idx="14"/>
+          </p:nvPr>
+        </p:nvSpPr>
+        <p:spPr/>
+        <p:txBody>
+          <a:bodyPr/>
+          <a:lstStyle/>
+          <a:p>
+            <a:r>
+              <a:rPr lang="en-GB" dirty="0"/>
+              <a:t>@ </a:t>
+            </a:r>
+            <a:r>
+              <a:rPr lang="en-GB" dirty="0" err="1"/>
+              <a:t>Kopter</a:t>
+            </a:r>
+            <a:r>
+              <a:rPr lang="en-GB" dirty="0"/>
+              <a:t> Group AG | Alejandro Valverde</a:t>
+            </a:r>
+          </a:p>
+        </p:txBody>
+      </p:sp>
+      <p:sp>
+        <p:nvSpPr>
+          <p:cNvPr id="4" name="Slide Number Placeholder 3"/>
+          <p:cNvSpPr>
+            <a:spLocks noGrp="1"/>
+          </p:cNvSpPr>
+          <p:nvPr>
+            <p:ph type="sldNum" sz="quarter" idx="12"/>
+          </p:nvPr>
+        </p:nvSpPr>
+        <p:spPr/>
+        <p:txBody>
+          <a:bodyPr/>
+          <a:lstStyle/>
+          <a:p>
+            <a:fld id="{011C9D03-AE4A-2848-9956-B167AE17B095}" type="slidenum">
+              <a:rPr lang="en-GB" smtClean="0"/>
+              <a:pPr/>
+              <a:t>12</a:t>
+            </a:fld>
+            <a:endParaRPr lang="en-GB" dirty="0"/>
+          </a:p>
+        </p:txBody>
+      </p:sp>
+      <p:sp>
+        <p:nvSpPr>
+          <p:cNvPr id="5" name="Date Placeholder 4"/>
+          <p:cNvSpPr>
+            <a:spLocks noGrp="1"/>
+          </p:cNvSpPr>
+          <p:nvPr>
+            <p:ph type="dt" sz="half" idx="10"/>
+          </p:nvPr>
+        </p:nvSpPr>
+        <p:spPr/>
+        <p:txBody>
+          <a:bodyPr/>
+          <a:lstStyle/>
+          <a:p>
+            <a:fld id="{16C1D5B0-5220-44BF-BD99-44FE20BE1773}" type="datetime5">
+              <a:rPr lang="en-US" smtClean="0"/>
+              <a:t>22-Feb-18</a:t>
+            </a:fld>
+            <a:endParaRPr lang="en-GB" dirty="0"/>
+          </a:p>
+        </p:txBody>
+      </p:sp>
+      <p:sp>
+        <p:nvSpPr>
+          <p:cNvPr id="10" name="Content Placeholder 2">
+            <a:extLst>
+              <a:ext uri="{FF2B5EF4-FFF2-40B4-BE49-F238E27FC236}">
+                <a16:creationId xmlns:a16="http://schemas.microsoft.com/office/drawing/2014/main" id="{C19AF051-9B1E-C04B-A28B-18DE801F3709}"/>
+              </a:ext>
+            </a:extLst>
+          </p:cNvPr>
+          <p:cNvSpPr>
+            <a:spLocks noGrp="1"/>
+          </p:cNvSpPr>
+          <p:nvPr>
+            <p:ph idx="1"/>
+          </p:nvPr>
+        </p:nvSpPr>
+        <p:spPr>
+          <a:xfrm>
+            <a:off x="504000" y="1148993"/>
+            <a:ext cx="7810500" cy="4576557"/>
+          </a:xfrm>
+        </p:spPr>
+        <p:txBody>
+          <a:bodyPr/>
+          <a:lstStyle/>
+          <a:p>
+            <a:pPr marL="0" indent="0">
+              <a:buNone/>
+            </a:pPr>
+            <a:r>
+              <a:rPr lang="en-GB" dirty="0"/>
+              <a:t>Give those </a:t>
+            </a:r>
+            <a:r>
+              <a:rPr lang="en-GB" dirty="0" err="1"/>
+              <a:t>F_aero</a:t>
+            </a:r>
+            <a:r>
+              <a:rPr lang="en-GB" dirty="0"/>
+              <a:t> and </a:t>
+            </a:r>
+            <a:r>
+              <a:rPr lang="en-GB" dirty="0" err="1"/>
+              <a:t>M_aero</a:t>
+            </a:r>
+            <a:r>
+              <a:rPr lang="en-GB" dirty="0"/>
+              <a:t> to Nico and the guys from Flight Physics to validate </a:t>
+            </a:r>
+            <a:r>
+              <a:rPr lang="en-GB" dirty="0" err="1"/>
+              <a:t>FlightLab</a:t>
+            </a:r>
+            <a:r>
+              <a:rPr lang="en-GB" dirty="0"/>
+              <a:t> model when trying to predict dynamic behaviour of the system</a:t>
+            </a:r>
+          </a:p>
+        </p:txBody>
+      </p:sp>
+    </p:spTree>
+    <p:extLst>
+      <p:ext uri="{BB962C8B-B14F-4D97-AF65-F5344CB8AC3E}">
+        <p14:creationId xmlns:p14="http://schemas.microsoft.com/office/powerpoint/2010/main" val="1100741161"/>
+      </p:ext>
+    </p:extLst>
+  </p:cSld>
+  <p:clrMapOvr>
+    <a:masterClrMapping/>
+  </p:clrMapOvr>
+</p:sld>
+</file>
+
+<file path=ppt/slides/slide13.xml><?xml version="1.0" encoding="utf-8"?>
+<p:sld xmlns:a="http://schemas.openxmlformats.org/drawingml/2006/main" xmlns:r="http://schemas.openxmlformats.org/officeDocument/2006/relationships" xmlns:p="http://schemas.openxmlformats.org/presentationml/2006/main">
+  <p:cSld>
     <p:bg>
       <p:bgPr>
         <a:solidFill>
@@ -4872,7 +5588,7 @@
             <a:fld id="{011C9D03-AE4A-2848-9956-B167AE17B095}" type="slidenum">
               <a:rPr lang="en-GB" smtClean="0"/>
               <a:pPr/>
-              <a:t>10</a:t>
+              <a:t>13</a:t>
             </a:fld>
             <a:endParaRPr lang="en-GB"/>
           </a:p>
@@ -4914,7 +5630,7 @@
 </p:sld>
 </file>
 
-<file path=ppt/slides/slide11.xml><?xml version="1.0" encoding="utf-8"?>
+<file path=ppt/slides/slide14.xml><?xml version="1.0" encoding="utf-8"?>
 <p:sld xmlns:a="http://schemas.openxmlformats.org/drawingml/2006/main" xmlns:r="http://schemas.openxmlformats.org/officeDocument/2006/relationships" xmlns:p="http://schemas.openxmlformats.org/presentationml/2006/main">
   <p:cSld>
     <p:spTree>
@@ -5049,38 +5765,38 @@
           <a:lstStyle/>
           <a:p>
             <a:r>
-              <a:rPr lang="en-US" dirty="0"/>
+              <a:rPr lang="en-US" sz="1600" dirty="0"/>
               <a:t>Aircraft stability and control derivatives obtained from this process allow:</a:t>
             </a:r>
           </a:p>
           <a:p>
             <a:r>
-              <a:rPr lang="en-GB" dirty="0"/>
+              <a:rPr lang="en-GB" sz="1600" dirty="0"/>
               <a:t>1. Handling qualities evaluation</a:t>
             </a:r>
           </a:p>
           <a:p>
             <a:r>
-              <a:rPr lang="en-US" dirty="0"/>
+              <a:rPr lang="en-US" sz="1600" dirty="0"/>
               <a:t>2. Data correlation for confidence in test techniques</a:t>
             </a:r>
           </a:p>
           <a:p>
             <a:r>
-              <a:rPr lang="en-US" dirty="0"/>
+              <a:rPr lang="en-US" sz="1600" dirty="0"/>
               <a:t>3. Data generation for flight simulation</a:t>
             </a:r>
           </a:p>
           <a:p>
             <a:r>
-              <a:rPr lang="en-US" dirty="0"/>
+              <a:rPr lang="en-US" sz="1600" dirty="0"/>
               <a:t>4. Flight control system design and </a:t>
             </a:r>
             <a:r>
-              <a:rPr lang="en-US" dirty="0" err="1"/>
+              <a:rPr lang="en-US" sz="1600" dirty="0" err="1"/>
               <a:t>optimisation</a:t>
             </a:r>
-            <a:endParaRPr lang="en-GB" dirty="0"/>
+            <a:endParaRPr lang="en-GB" sz="1600" dirty="0"/>
           </a:p>
         </p:txBody>
       </p:sp>
@@ -5170,7 +5886,7 @@
     </p:spTree>
     <p:extLst>
       <p:ext uri="{BB962C8B-B14F-4D97-AF65-F5344CB8AC3E}">
-        <p14:creationId xmlns:p14="http://schemas.microsoft.com/office/powerpoint/2010/main" val="4186321142"/>
+        <p14:creationId xmlns:p14="http://schemas.microsoft.com/office/powerpoint/2010/main" val="3233539809"/>
       </p:ext>
     </p:extLst>
   </p:cSld>
@@ -5224,66 +5940,12 @@
           <a:lstStyle/>
           <a:p>
             <a:r>
-              <a:rPr lang="en-GB" dirty="0"/>
-              <a:t>Why to introduce System ID into P3 test campaign? </a:t>
-            </a:r>
-          </a:p>
-        </p:txBody>
-      </p:sp>
-      <p:sp>
-        <p:nvSpPr>
-          <p:cNvPr id="3" name="Content Placeholder 2">
-            <a:extLst>
-              <a:ext uri="{FF2B5EF4-FFF2-40B4-BE49-F238E27FC236}">
-                <a16:creationId xmlns:a16="http://schemas.microsoft.com/office/drawing/2014/main" id="{C19AF051-9B1E-C04B-A28B-18DE801F3709}"/>
-              </a:ext>
-            </a:extLst>
-          </p:cNvPr>
-          <p:cNvSpPr>
-            <a:spLocks noGrp="1"/>
-          </p:cNvSpPr>
-          <p:nvPr>
-            <p:ph idx="1"/>
-          </p:nvPr>
-        </p:nvSpPr>
-        <p:spPr>
-          <a:xfrm>
-            <a:off x="504000" y="1148994"/>
-            <a:ext cx="7810500" cy="4703166"/>
-          </a:xfrm>
-        </p:spPr>
-        <p:txBody>
-          <a:bodyPr/>
-          <a:lstStyle/>
-          <a:p>
-            <a:pPr marL="342900" indent="-342900">
-              <a:buFont typeface="Arial" panose="020B0604020202020204" pitchFamily="34" charset="0"/>
-              <a:buChar char="•"/>
-            </a:pPr>
-            <a:r>
-              <a:rPr lang="en-GB" dirty="0"/>
-              <a:t>To boost flight test productivity  </a:t>
-            </a:r>
-          </a:p>
-          <a:p>
-            <a:pPr marL="342900" indent="-342900">
-              <a:buFont typeface="Arial" panose="020B0604020202020204" pitchFamily="34" charset="0"/>
-              <a:buChar char="•"/>
-            </a:pPr>
-            <a:endParaRPr lang="en-GB" dirty="0"/>
-          </a:p>
-          <a:p>
-            <a:pPr marL="342900" indent="-342900">
-              <a:buFont typeface="Arial" panose="020B0604020202020204" pitchFamily="34" charset="0"/>
-              <a:buChar char="•"/>
-            </a:pPr>
-            <a:r>
-              <a:rPr lang="en-GB" dirty="0"/>
-              <a:t>System</a:t>
-            </a:r>
-            <a:r>
-              <a:rPr lang="en-US" dirty="0"/>
-              <a:t> ID takes time and money – but not nearly as much as not doing it</a:t>
+              <a:rPr lang="en-GB" dirty="0" smtClean="0"/>
+              <a:t>Proble</a:t>
+            </a:r>
+            <a:r>
+              <a:rPr lang="en-GB" dirty="0" smtClean="0"/>
+              <a:t>m overlook</a:t>
             </a:r>
             <a:endParaRPr lang="en-GB" dirty="0"/>
           </a:p>
@@ -5372,10 +6034,34 @@
           </a:p>
         </p:txBody>
       </p:sp>
+      <p:pic>
+        <p:nvPicPr>
+          <p:cNvPr id="8" name="Picture 7"/>
+          <p:cNvPicPr>
+            <a:picLocks noChangeAspect="1"/>
+          </p:cNvPicPr>
+          <p:nvPr/>
+        </p:nvPicPr>
+        <p:blipFill>
+          <a:blip r:embed="rId2"/>
+          <a:stretch>
+            <a:fillRect/>
+          </a:stretch>
+        </p:blipFill>
+        <p:spPr>
+          <a:xfrm>
+            <a:off x="769620" y="1271211"/>
+            <a:ext cx="4693920" cy="2107306"/>
+          </a:xfrm>
+          <a:prstGeom prst="rect">
+            <a:avLst/>
+          </a:prstGeom>
+        </p:spPr>
+      </p:pic>
     </p:spTree>
     <p:extLst>
       <p:ext uri="{BB962C8B-B14F-4D97-AF65-F5344CB8AC3E}">
-        <p14:creationId xmlns:p14="http://schemas.microsoft.com/office/powerpoint/2010/main" val="2756699653"/>
+        <p14:creationId xmlns:p14="http://schemas.microsoft.com/office/powerpoint/2010/main" val="4186321142"/>
       </p:ext>
     </p:extLst>
   </p:cSld>
@@ -5430,8 +6116,67 @@
           <a:p>
             <a:r>
               <a:rPr lang="en-GB" dirty="0"/>
-              <a:t>Basic problem in Dynamics</a:t>
-            </a:r>
+              <a:t>Why to introduce System ID into P3 test campaign? </a:t>
+            </a:r>
+          </a:p>
+        </p:txBody>
+      </p:sp>
+      <p:sp>
+        <p:nvSpPr>
+          <p:cNvPr id="3" name="Content Placeholder 2">
+            <a:extLst>
+              <a:ext uri="{FF2B5EF4-FFF2-40B4-BE49-F238E27FC236}">
+                <a16:creationId xmlns:a16="http://schemas.microsoft.com/office/drawing/2014/main" id="{C19AF051-9B1E-C04B-A28B-18DE801F3709}"/>
+              </a:ext>
+            </a:extLst>
+          </p:cNvPr>
+          <p:cNvSpPr>
+            <a:spLocks noGrp="1"/>
+          </p:cNvSpPr>
+          <p:nvPr>
+            <p:ph idx="1"/>
+          </p:nvPr>
+        </p:nvSpPr>
+        <p:spPr>
+          <a:xfrm>
+            <a:off x="504000" y="1148994"/>
+            <a:ext cx="7810500" cy="4703166"/>
+          </a:xfrm>
+        </p:spPr>
+        <p:txBody>
+          <a:bodyPr/>
+          <a:lstStyle/>
+          <a:p>
+            <a:pPr marL="342900" indent="-342900">
+              <a:buFont typeface="Arial" panose="020B0604020202020204" pitchFamily="34" charset="0"/>
+              <a:buChar char="•"/>
+            </a:pPr>
+            <a:r>
+              <a:rPr lang="en-GB" sz="1600" dirty="0"/>
+              <a:t>To boost flight test productivity  </a:t>
+            </a:r>
+          </a:p>
+          <a:p>
+            <a:pPr marL="342900" indent="-342900">
+              <a:buFont typeface="Arial" panose="020B0604020202020204" pitchFamily="34" charset="0"/>
+              <a:buChar char="•"/>
+            </a:pPr>
+            <a:endParaRPr lang="en-GB" sz="1600" dirty="0"/>
+          </a:p>
+          <a:p>
+            <a:pPr marL="342900" indent="-342900">
+              <a:buFont typeface="Arial" panose="020B0604020202020204" pitchFamily="34" charset="0"/>
+              <a:buChar char="•"/>
+            </a:pPr>
+            <a:r>
+              <a:rPr lang="en-GB" sz="1600" dirty="0"/>
+              <a:t>System</a:t>
+            </a:r>
+            <a:r>
+              <a:rPr lang="en-US" sz="1600" dirty="0"/>
+              <a:t> ID takes time and money – but not nearly as much as not doing it</a:t>
+            </a:r>
+            <a:endParaRPr lang="en-GB" sz="1600" dirty="0"/>
           </a:p>
         </p:txBody>
       </p:sp>
@@ -5518,40 +6263,10 @@
           </a:p>
         </p:txBody>
       </p:sp>
-      <p:pic>
-        <p:nvPicPr>
-          <p:cNvPr id="10" name="Grafik 9">
-            <a:extLst>
-              <a:ext uri="{FF2B5EF4-FFF2-40B4-BE49-F238E27FC236}">
-                <a16:creationId xmlns:a16="http://schemas.microsoft.com/office/drawing/2014/main" id="{2883BEB5-DBEA-4BCB-8BAC-513E22EDA23A}"/>
-              </a:ext>
-            </a:extLst>
-          </p:cNvPr>
-          <p:cNvPicPr>
-            <a:picLocks noChangeAspect="1"/>
-          </p:cNvPicPr>
-          <p:nvPr/>
-        </p:nvPicPr>
-        <p:blipFill>
-          <a:blip r:embed="rId2"/>
-          <a:stretch>
-            <a:fillRect/>
-          </a:stretch>
-        </p:blipFill>
-        <p:spPr>
-          <a:xfrm>
-            <a:off x="1736774" y="1355658"/>
-            <a:ext cx="6183337" cy="4453839"/>
-          </a:xfrm>
-          <a:prstGeom prst="rect">
-            <a:avLst/>
-          </a:prstGeom>
-        </p:spPr>
-      </p:pic>
     </p:spTree>
     <p:extLst>
       <p:ext uri="{BB962C8B-B14F-4D97-AF65-F5344CB8AC3E}">
-        <p14:creationId xmlns:p14="http://schemas.microsoft.com/office/powerpoint/2010/main" val="3600795312"/>
+        <p14:creationId xmlns:p14="http://schemas.microsoft.com/office/powerpoint/2010/main" val="2756699653"/>
       </p:ext>
     </p:extLst>
   </p:cSld>
@@ -5606,7 +6321,7 @@
           <a:p>
             <a:r>
               <a:rPr lang="en-GB" dirty="0"/>
-              <a:t>Aircraft System Identification</a:t>
+              <a:t>Basic problem in Dynamics</a:t>
             </a:r>
           </a:p>
         </p:txBody>
@@ -5696,10 +6411,10 @@
       </p:sp>
       <p:pic>
         <p:nvPicPr>
-          <p:cNvPr id="3" name="Grafik 2">
+          <p:cNvPr id="10" name="Grafik 9">
             <a:extLst>
               <a:ext uri="{FF2B5EF4-FFF2-40B4-BE49-F238E27FC236}">
-                <a16:creationId xmlns:a16="http://schemas.microsoft.com/office/drawing/2014/main" id="{88FF0D8E-FA19-4144-BCA6-80638734E310}"/>
+                <a16:creationId xmlns:a16="http://schemas.microsoft.com/office/drawing/2014/main" id="{2883BEB5-DBEA-4BCB-8BAC-513E22EDA23A}"/>
               </a:ext>
             </a:extLst>
           </p:cNvPr>
@@ -5716,8 +6431,8 @@
         </p:blipFill>
         <p:spPr>
           <a:xfrm>
-            <a:off x="995362" y="704850"/>
-            <a:ext cx="7153275" cy="5448300"/>
+            <a:off x="1736774" y="1355658"/>
+            <a:ext cx="6183337" cy="4453839"/>
           </a:xfrm>
           <a:prstGeom prst="rect">
             <a:avLst/>
@@ -5727,7 +6442,7 @@
     </p:spTree>
     <p:extLst>
       <p:ext uri="{BB962C8B-B14F-4D97-AF65-F5344CB8AC3E}">
-        <p14:creationId xmlns:p14="http://schemas.microsoft.com/office/powerpoint/2010/main" val="2167726244"/>
+        <p14:creationId xmlns:p14="http://schemas.microsoft.com/office/powerpoint/2010/main" val="3600795312"/>
       </p:ext>
     </p:extLst>
   </p:cSld>
@@ -5782,67 +6497,7 @@
           <a:p>
             <a:r>
               <a:rPr lang="en-GB" dirty="0"/>
-              <a:t>Close the loop</a:t>
-            </a:r>
-          </a:p>
-        </p:txBody>
-      </p:sp>
-      <p:sp>
-        <p:nvSpPr>
-          <p:cNvPr id="3" name="Content Placeholder 2">
-            <a:extLst>
-              <a:ext uri="{FF2B5EF4-FFF2-40B4-BE49-F238E27FC236}">
-                <a16:creationId xmlns:a16="http://schemas.microsoft.com/office/drawing/2014/main" id="{C19AF051-9B1E-C04B-A28B-18DE801F3709}"/>
-              </a:ext>
-            </a:extLst>
-          </p:cNvPr>
-          <p:cNvSpPr>
-            <a:spLocks noGrp="1"/>
-          </p:cNvSpPr>
-          <p:nvPr>
-            <p:ph idx="1"/>
-          </p:nvPr>
-        </p:nvSpPr>
-        <p:spPr>
-          <a:xfrm>
-            <a:off x="504000" y="1148993"/>
-            <a:ext cx="7810500" cy="4576557"/>
-          </a:xfrm>
-        </p:spPr>
-        <p:txBody>
-          <a:bodyPr/>
-          <a:lstStyle/>
-          <a:p>
-            <a:pPr marL="0" indent="0">
-              <a:buNone/>
-            </a:pPr>
-            <a:r>
-              <a:rPr lang="en-GB" dirty="0"/>
-              <a:t>Give those </a:t>
-            </a:r>
-            <a:r>
-              <a:rPr lang="en-GB" dirty="0" err="1"/>
-              <a:t>F_aero</a:t>
-            </a:r>
-            <a:r>
-              <a:rPr lang="en-GB" dirty="0"/>
-              <a:t> and </a:t>
-            </a:r>
-            <a:r>
-              <a:rPr lang="en-GB" dirty="0" err="1"/>
-              <a:t>M_aero</a:t>
-            </a:r>
-            <a:r>
-              <a:rPr lang="en-GB" dirty="0"/>
-              <a:t> to Nico and the guys from Flight Physics to validate </a:t>
-            </a:r>
-            <a:r>
-              <a:rPr lang="en-GB" dirty="0" err="1"/>
-              <a:t>FlightLab</a:t>
-            </a:r>
-            <a:r>
-              <a:rPr lang="en-GB" dirty="0"/>
-              <a:t> model when trying to predict dynamic behaviour of the system</a:t>
+              <a:t>Aircraft System Identification</a:t>
             </a:r>
           </a:p>
         </p:txBody>
@@ -5930,10 +6585,40 @@
           </a:p>
         </p:txBody>
       </p:sp>
+      <p:pic>
+        <p:nvPicPr>
+          <p:cNvPr id="3" name="Grafik 2">
+            <a:extLst>
+              <a:ext uri="{FF2B5EF4-FFF2-40B4-BE49-F238E27FC236}">
+                <a16:creationId xmlns:a16="http://schemas.microsoft.com/office/drawing/2014/main" id="{88FF0D8E-FA19-4144-BCA6-80638734E310}"/>
+              </a:ext>
+            </a:extLst>
+          </p:cNvPr>
+          <p:cNvPicPr>
+            <a:picLocks noChangeAspect="1"/>
+          </p:cNvPicPr>
+          <p:nvPr/>
+        </p:nvPicPr>
+        <p:blipFill>
+          <a:blip r:embed="rId2"/>
+          <a:stretch>
+            <a:fillRect/>
+          </a:stretch>
+        </p:blipFill>
+        <p:spPr>
+          <a:xfrm>
+            <a:off x="995362" y="704850"/>
+            <a:ext cx="7153275" cy="5448300"/>
+          </a:xfrm>
+          <a:prstGeom prst="rect">
+            <a:avLst/>
+          </a:prstGeom>
+        </p:spPr>
+      </p:pic>
     </p:spTree>
     <p:extLst>
       <p:ext uri="{BB962C8B-B14F-4D97-AF65-F5344CB8AC3E}">
-        <p14:creationId xmlns:p14="http://schemas.microsoft.com/office/powerpoint/2010/main" val="523109830"/>
+        <p14:creationId xmlns:p14="http://schemas.microsoft.com/office/powerpoint/2010/main" val="2167726244"/>
       </p:ext>
     </p:extLst>
   </p:cSld>
@@ -5988,7 +6673,67 @@
           <a:p>
             <a:r>
               <a:rPr lang="en-GB" dirty="0"/>
-              <a:t>How does it work?</a:t>
+              <a:t>Close the loop</a:t>
+            </a:r>
+          </a:p>
+        </p:txBody>
+      </p:sp>
+      <p:sp>
+        <p:nvSpPr>
+          <p:cNvPr id="3" name="Content Placeholder 2">
+            <a:extLst>
+              <a:ext uri="{FF2B5EF4-FFF2-40B4-BE49-F238E27FC236}">
+                <a16:creationId xmlns:a16="http://schemas.microsoft.com/office/drawing/2014/main" id="{C19AF051-9B1E-C04B-A28B-18DE801F3709}"/>
+              </a:ext>
+            </a:extLst>
+          </p:cNvPr>
+          <p:cNvSpPr>
+            <a:spLocks noGrp="1"/>
+          </p:cNvSpPr>
+          <p:nvPr>
+            <p:ph idx="1"/>
+          </p:nvPr>
+        </p:nvSpPr>
+        <p:spPr>
+          <a:xfrm>
+            <a:off x="504000" y="1148993"/>
+            <a:ext cx="7810500" cy="4576557"/>
+          </a:xfrm>
+        </p:spPr>
+        <p:txBody>
+          <a:bodyPr/>
+          <a:lstStyle/>
+          <a:p>
+            <a:pPr marL="0" indent="0">
+              <a:buNone/>
+            </a:pPr>
+            <a:r>
+              <a:rPr lang="en-GB" dirty="0"/>
+              <a:t>Give those </a:t>
+            </a:r>
+            <a:r>
+              <a:rPr lang="en-GB" dirty="0" err="1"/>
+              <a:t>F_aero</a:t>
+            </a:r>
+            <a:r>
+              <a:rPr lang="en-GB" dirty="0"/>
+              <a:t> and </a:t>
+            </a:r>
+            <a:r>
+              <a:rPr lang="en-GB" dirty="0" err="1"/>
+              <a:t>M_aero</a:t>
+            </a:r>
+            <a:r>
+              <a:rPr lang="en-GB" dirty="0"/>
+              <a:t> to Nico and the guys from Flight Physics to validate </a:t>
+            </a:r>
+            <a:r>
+              <a:rPr lang="en-GB" dirty="0" err="1"/>
+              <a:t>FlightLab</a:t>
+            </a:r>
+            <a:r>
+              <a:rPr lang="en-GB" dirty="0"/>
+              <a:t> model when trying to predict dynamic behaviour of the system</a:t>
             </a:r>
           </a:p>
         </p:txBody>
@@ -6076,40 +6821,10 @@
           </a:p>
         </p:txBody>
       </p:sp>
-      <p:pic>
-        <p:nvPicPr>
-          <p:cNvPr id="9" name="Grafik 8">
-            <a:extLst>
-              <a:ext uri="{FF2B5EF4-FFF2-40B4-BE49-F238E27FC236}">
-                <a16:creationId xmlns:a16="http://schemas.microsoft.com/office/drawing/2014/main" id="{374BE5AE-A64E-426E-9C3B-14ED4A4BCFF5}"/>
-              </a:ext>
-            </a:extLst>
-          </p:cNvPr>
-          <p:cNvPicPr>
-            <a:picLocks noChangeAspect="1"/>
-          </p:cNvPicPr>
-          <p:nvPr/>
-        </p:nvPicPr>
-        <p:blipFill>
-          <a:blip r:embed="rId2"/>
-          <a:stretch>
-            <a:fillRect/>
-          </a:stretch>
-        </p:blipFill>
-        <p:spPr>
-          <a:xfrm>
-            <a:off x="1299223" y="877054"/>
-            <a:ext cx="6800777" cy="5089781"/>
-          </a:xfrm>
-          <a:prstGeom prst="rect">
-            <a:avLst/>
-          </a:prstGeom>
-        </p:spPr>
-      </p:pic>
     </p:spTree>
     <p:extLst>
       <p:ext uri="{BB962C8B-B14F-4D97-AF65-F5344CB8AC3E}">
-        <p14:creationId xmlns:p14="http://schemas.microsoft.com/office/powerpoint/2010/main" val="4270212500"/>
+        <p14:creationId xmlns:p14="http://schemas.microsoft.com/office/powerpoint/2010/main" val="523109830"/>
       </p:ext>
     </p:extLst>
   </p:cSld>
@@ -6164,7 +6879,7 @@
           <a:p>
             <a:r>
               <a:rPr lang="en-GB" dirty="0"/>
-              <a:t>Flight envelope expansion</a:t>
+              <a:t>How does it work?</a:t>
             </a:r>
           </a:p>
         </p:txBody>
@@ -6254,10 +6969,10 @@
       </p:sp>
       <p:pic>
         <p:nvPicPr>
-          <p:cNvPr id="3" name="Grafik 2">
+          <p:cNvPr id="9" name="Grafik 8">
             <a:extLst>
               <a:ext uri="{FF2B5EF4-FFF2-40B4-BE49-F238E27FC236}">
-                <a16:creationId xmlns:a16="http://schemas.microsoft.com/office/drawing/2014/main" id="{16F340ED-0F80-4D05-9B83-BF1303F56C91}"/>
+                <a16:creationId xmlns:a16="http://schemas.microsoft.com/office/drawing/2014/main" id="{374BE5AE-A64E-426E-9C3B-14ED4A4BCFF5}"/>
               </a:ext>
             </a:extLst>
           </p:cNvPr>
@@ -6274,8 +6989,8 @@
         </p:blipFill>
         <p:spPr>
           <a:xfrm>
-            <a:off x="1028265" y="1519311"/>
-            <a:ext cx="7133092" cy="4780689"/>
+            <a:off x="1299223" y="877054"/>
+            <a:ext cx="6800777" cy="5089781"/>
           </a:xfrm>
           <a:prstGeom prst="rect">
             <a:avLst/>
@@ -6285,7 +7000,7 @@
     </p:spTree>
     <p:extLst>
       <p:ext uri="{BB962C8B-B14F-4D97-AF65-F5344CB8AC3E}">
-        <p14:creationId xmlns:p14="http://schemas.microsoft.com/office/powerpoint/2010/main" val="3501868766"/>
+        <p14:creationId xmlns:p14="http://schemas.microsoft.com/office/powerpoint/2010/main" val="4270212500"/>
       </p:ext>
     </p:extLst>
   </p:cSld>
@@ -6340,86 +7055,8 @@
           <a:p>
             <a:r>
               <a:rPr lang="en-GB" dirty="0"/>
-              <a:t>What would I need?</a:t>
-            </a:r>
-          </a:p>
-        </p:txBody>
-      </p:sp>
-      <p:sp>
-        <p:nvSpPr>
-          <p:cNvPr id="3" name="Content Placeholder 2">
-            <a:extLst>
-              <a:ext uri="{FF2B5EF4-FFF2-40B4-BE49-F238E27FC236}">
-                <a16:creationId xmlns:a16="http://schemas.microsoft.com/office/drawing/2014/main" id="{C19AF051-9B1E-C04B-A28B-18DE801F3709}"/>
-              </a:ext>
-            </a:extLst>
-          </p:cNvPr>
-          <p:cNvSpPr>
-            <a:spLocks noGrp="1"/>
-          </p:cNvSpPr>
-          <p:nvPr>
-            <p:ph idx="1"/>
-          </p:nvPr>
-        </p:nvSpPr>
-        <p:spPr>
-          <a:xfrm>
-            <a:off x="504000" y="1148993"/>
-            <a:ext cx="7810500" cy="4576557"/>
-          </a:xfrm>
-        </p:spPr>
-        <p:txBody>
-          <a:bodyPr/>
-          <a:lstStyle/>
-          <a:p>
-            <a:pPr marL="0" indent="0">
-              <a:buNone/>
-            </a:pPr>
-            <a:r>
-              <a:rPr lang="en-GB" dirty="0"/>
-              <a:t>A laptop </a:t>
-            </a:r>
-          </a:p>
-          <a:p>
-            <a:pPr marL="0" indent="0">
-              <a:buNone/>
-            </a:pPr>
-            <a:endParaRPr lang="en-GB" dirty="0"/>
-          </a:p>
-          <a:p>
-            <a:pPr marL="0" indent="0">
-              <a:buNone/>
-            </a:pPr>
-            <a:r>
-              <a:rPr lang="en-GB" dirty="0"/>
-              <a:t>some accelerometers installed in P3, a part from the usual instrumentation…</a:t>
-            </a:r>
-          </a:p>
-          <a:p>
-            <a:pPr marL="0" indent="0">
-              <a:buNone/>
-            </a:pPr>
-            <a:endParaRPr lang="en-GB" dirty="0"/>
-          </a:p>
-          <a:p>
-            <a:pPr marL="0" indent="0">
-              <a:buNone/>
-            </a:pPr>
-            <a:r>
-              <a:rPr lang="en-GB" dirty="0"/>
-              <a:t>Some coffee</a:t>
-            </a:r>
-          </a:p>
-          <a:p>
-            <a:pPr marL="0" indent="0">
-              <a:buNone/>
-            </a:pPr>
-            <a:endParaRPr lang="en-GB" dirty="0"/>
-          </a:p>
-          <a:p>
-            <a:pPr marL="0" indent="0">
-              <a:buNone/>
-            </a:pPr>
-            <a:endParaRPr lang="en-GB" dirty="0"/>
+              <a:t>Flight envelope expansion</a:t>
+            </a:r>
           </a:p>
         </p:txBody>
       </p:sp>
@@ -6506,10 +7143,40 @@
           </a:p>
         </p:txBody>
       </p:sp>
+      <p:pic>
+        <p:nvPicPr>
+          <p:cNvPr id="3" name="Grafik 2">
+            <a:extLst>
+              <a:ext uri="{FF2B5EF4-FFF2-40B4-BE49-F238E27FC236}">
+                <a16:creationId xmlns:a16="http://schemas.microsoft.com/office/drawing/2014/main" id="{16F340ED-0F80-4D05-9B83-BF1303F56C91}"/>
+              </a:ext>
+            </a:extLst>
+          </p:cNvPr>
+          <p:cNvPicPr>
+            <a:picLocks noChangeAspect="1"/>
+          </p:cNvPicPr>
+          <p:nvPr/>
+        </p:nvPicPr>
+        <p:blipFill>
+          <a:blip r:embed="rId2"/>
+          <a:stretch>
+            <a:fillRect/>
+          </a:stretch>
+        </p:blipFill>
+        <p:spPr>
+          <a:xfrm>
+            <a:off x="1028265" y="1519311"/>
+            <a:ext cx="7133092" cy="4780689"/>
+          </a:xfrm>
+          <a:prstGeom prst="rect">
+            <a:avLst/>
+          </a:prstGeom>
+        </p:spPr>
+      </p:pic>
     </p:spTree>
     <p:extLst>
       <p:ext uri="{BB962C8B-B14F-4D97-AF65-F5344CB8AC3E}">
-        <p14:creationId xmlns:p14="http://schemas.microsoft.com/office/powerpoint/2010/main" val="3427268158"/>
+        <p14:creationId xmlns:p14="http://schemas.microsoft.com/office/powerpoint/2010/main" val="3501868766"/>
       </p:ext>
     </p:extLst>
   </p:cSld>

</xml_diff>